<commit_message>
Unit and Integration Tests Update
</commit_message>
<xml_diff>
--- a/org.mwc.debrief.legacy/test_data/PlotTracks/validateDonor/correct.pptx
+++ b/org.mwc.debrief.legacy/test_data/PlotTracks/validateDonor/correct.pptx
@@ -208,7 +208,7 @@
           <a:p>
             <a:fld id="{5DBDFAF8-9CD3-4716-8CF2-6121A8FDDE9B}" type="datetimeFigureOut">
               <a:rPr lang="en-US" smtClean="0"/>
-              <a:t>9/27/2018</a:t>
+              <a:t>10/14/2018</a:t>
             </a:fld>
             <a:endParaRPr lang="en-US"/>
           </a:p>
@@ -366,7 +366,7 @@
           <a:p>
             <a:fld id="{C901C09C-499D-45C7-B51C-6D106952E995}" type="slidenum">
               <a:rPr lang="en-US" smtClean="0"/>
-              <a:t>‹#›</a:t>
+              <a:t>‹Nº›</a:t>
             </a:fld>
             <a:endParaRPr lang="en-US"/>
           </a:p>
@@ -763,7 +763,7 @@
           <a:p>
             <a:fld id="{07AF7C9C-3FFC-F543-8CD5-56B058077314}" type="datetimeFigureOut">
               <a:rPr lang="en-US" smtClean="0"/>
-              <a:t>9/27/2018</a:t>
+              <a:t>10/14/2018</a:t>
             </a:fld>
             <a:endParaRPr lang="en-US"/>
           </a:p>
@@ -805,7 +805,7 @@
           <a:p>
             <a:fld id="{E0E3E4AF-3478-F94E-9240-CA1945652EFF}" type="slidenum">
               <a:rPr lang="en-US" smtClean="0"/>
-              <a:t>‹#›</a:t>
+              <a:t>‹Nº›</a:t>
             </a:fld>
             <a:endParaRPr lang="en-US"/>
           </a:p>
@@ -933,7 +933,7 @@
           <a:p>
             <a:fld id="{07AF7C9C-3FFC-F543-8CD5-56B058077314}" type="datetimeFigureOut">
               <a:rPr lang="en-US" smtClean="0"/>
-              <a:t>9/27/2018</a:t>
+              <a:t>10/14/2018</a:t>
             </a:fld>
             <a:endParaRPr lang="en-US"/>
           </a:p>
@@ -975,7 +975,7 @@
           <a:p>
             <a:fld id="{E0E3E4AF-3478-F94E-9240-CA1945652EFF}" type="slidenum">
               <a:rPr lang="en-US" smtClean="0"/>
-              <a:t>‹#›</a:t>
+              <a:t>‹Nº›</a:t>
             </a:fld>
             <a:endParaRPr lang="en-US"/>
           </a:p>
@@ -1113,7 +1113,7 @@
           <a:p>
             <a:fld id="{07AF7C9C-3FFC-F543-8CD5-56B058077314}" type="datetimeFigureOut">
               <a:rPr lang="en-US" smtClean="0"/>
-              <a:t>9/27/2018</a:t>
+              <a:t>10/14/2018</a:t>
             </a:fld>
             <a:endParaRPr lang="en-US"/>
           </a:p>
@@ -1155,7 +1155,7 @@
           <a:p>
             <a:fld id="{E0E3E4AF-3478-F94E-9240-CA1945652EFF}" type="slidenum">
               <a:rPr lang="en-US" smtClean="0"/>
-              <a:t>‹#›</a:t>
+              <a:t>‹Nº›</a:t>
             </a:fld>
             <a:endParaRPr lang="en-US"/>
           </a:p>
@@ -1283,7 +1283,7 @@
           <a:p>
             <a:fld id="{07AF7C9C-3FFC-F543-8CD5-56B058077314}" type="datetimeFigureOut">
               <a:rPr lang="en-US" smtClean="0"/>
-              <a:t>9/27/2018</a:t>
+              <a:t>10/14/2018</a:t>
             </a:fld>
             <a:endParaRPr lang="en-US"/>
           </a:p>
@@ -1325,7 +1325,7 @@
           <a:p>
             <a:fld id="{E0E3E4AF-3478-F94E-9240-CA1945652EFF}" type="slidenum">
               <a:rPr lang="en-US" smtClean="0"/>
-              <a:t>‹#›</a:t>
+              <a:t>‹Nº›</a:t>
             </a:fld>
             <a:endParaRPr lang="en-US"/>
           </a:p>
@@ -1529,7 +1529,7 @@
           <a:p>
             <a:fld id="{07AF7C9C-3FFC-F543-8CD5-56B058077314}" type="datetimeFigureOut">
               <a:rPr lang="en-US" smtClean="0"/>
-              <a:t>9/27/2018</a:t>
+              <a:t>10/14/2018</a:t>
             </a:fld>
             <a:endParaRPr lang="en-US"/>
           </a:p>
@@ -1571,7 +1571,7 @@
           <a:p>
             <a:fld id="{E0E3E4AF-3478-F94E-9240-CA1945652EFF}" type="slidenum">
               <a:rPr lang="en-US" smtClean="0"/>
-              <a:t>‹#›</a:t>
+              <a:t>‹Nº›</a:t>
             </a:fld>
             <a:endParaRPr lang="en-US"/>
           </a:p>
@@ -1817,7 +1817,7 @@
           <a:p>
             <a:fld id="{07AF7C9C-3FFC-F543-8CD5-56B058077314}" type="datetimeFigureOut">
               <a:rPr lang="en-US" smtClean="0"/>
-              <a:t>9/27/2018</a:t>
+              <a:t>10/14/2018</a:t>
             </a:fld>
             <a:endParaRPr lang="en-US"/>
           </a:p>
@@ -1859,7 +1859,7 @@
           <a:p>
             <a:fld id="{E0E3E4AF-3478-F94E-9240-CA1945652EFF}" type="slidenum">
               <a:rPr lang="en-US" smtClean="0"/>
-              <a:t>‹#›</a:t>
+              <a:t>‹Nº›</a:t>
             </a:fld>
             <a:endParaRPr lang="en-US"/>
           </a:p>
@@ -2239,7 +2239,7 @@
           <a:p>
             <a:fld id="{07AF7C9C-3FFC-F543-8CD5-56B058077314}" type="datetimeFigureOut">
               <a:rPr lang="en-US" smtClean="0"/>
-              <a:t>9/27/2018</a:t>
+              <a:t>10/14/2018</a:t>
             </a:fld>
             <a:endParaRPr lang="en-US"/>
           </a:p>
@@ -2281,7 +2281,7 @@
           <a:p>
             <a:fld id="{E0E3E4AF-3478-F94E-9240-CA1945652EFF}" type="slidenum">
               <a:rPr lang="en-US" smtClean="0"/>
-              <a:t>‹#›</a:t>
+              <a:t>‹Nº›</a:t>
             </a:fld>
             <a:endParaRPr lang="en-US"/>
           </a:p>
@@ -2357,7 +2357,7 @@
           <a:p>
             <a:fld id="{07AF7C9C-3FFC-F543-8CD5-56B058077314}" type="datetimeFigureOut">
               <a:rPr lang="en-US" smtClean="0"/>
-              <a:t>9/27/2018</a:t>
+              <a:t>10/14/2018</a:t>
             </a:fld>
             <a:endParaRPr lang="en-US"/>
           </a:p>
@@ -2399,7 +2399,7 @@
           <a:p>
             <a:fld id="{E0E3E4AF-3478-F94E-9240-CA1945652EFF}" type="slidenum">
               <a:rPr lang="en-US" smtClean="0"/>
-              <a:t>‹#›</a:t>
+              <a:t>‹Nº›</a:t>
             </a:fld>
             <a:endParaRPr lang="en-US"/>
           </a:p>
@@ -2452,7 +2452,7 @@
           <a:p>
             <a:fld id="{07AF7C9C-3FFC-F543-8CD5-56B058077314}" type="datetimeFigureOut">
               <a:rPr lang="en-US" smtClean="0"/>
-              <a:t>9/27/2018</a:t>
+              <a:t>10/14/2018</a:t>
             </a:fld>
             <a:endParaRPr lang="en-US"/>
           </a:p>
@@ -2494,7 +2494,7 @@
           <a:p>
             <a:fld id="{E0E3E4AF-3478-F94E-9240-CA1945652EFF}" type="slidenum">
               <a:rPr lang="en-US" smtClean="0"/>
-              <a:t>‹#›</a:t>
+              <a:t>‹Nº›</a:t>
             </a:fld>
             <a:endParaRPr lang="en-US"/>
           </a:p>
@@ -2729,7 +2729,7 @@
           <a:p>
             <a:fld id="{07AF7C9C-3FFC-F543-8CD5-56B058077314}" type="datetimeFigureOut">
               <a:rPr lang="en-US" smtClean="0"/>
-              <a:t>9/27/2018</a:t>
+              <a:t>10/14/2018</a:t>
             </a:fld>
             <a:endParaRPr lang="en-US"/>
           </a:p>
@@ -2771,7 +2771,7 @@
           <a:p>
             <a:fld id="{E0E3E4AF-3478-F94E-9240-CA1945652EFF}" type="slidenum">
               <a:rPr lang="en-US" smtClean="0"/>
-              <a:t>‹#›</a:t>
+              <a:t>‹Nº›</a:t>
             </a:fld>
             <a:endParaRPr lang="en-US"/>
           </a:p>
@@ -2982,7 +2982,7 @@
           <a:p>
             <a:fld id="{07AF7C9C-3FFC-F543-8CD5-56B058077314}" type="datetimeFigureOut">
               <a:rPr lang="en-US" smtClean="0"/>
-              <a:t>9/27/2018</a:t>
+              <a:t>10/14/2018</a:t>
             </a:fld>
             <a:endParaRPr lang="en-US"/>
           </a:p>
@@ -3024,7 +3024,7 @@
           <a:p>
             <a:fld id="{E0E3E4AF-3478-F94E-9240-CA1945652EFF}" type="slidenum">
               <a:rPr lang="en-US" smtClean="0"/>
-              <a:t>‹#›</a:t>
+              <a:t>‹Nº›</a:t>
             </a:fld>
             <a:endParaRPr lang="en-US"/>
           </a:p>
@@ -3195,7 +3195,7 @@
           <a:p>
             <a:fld id="{07AF7C9C-3FFC-F543-8CD5-56B058077314}" type="datetimeFigureOut">
               <a:rPr lang="en-US" smtClean="0"/>
-              <a:t>9/27/2018</a:t>
+              <a:t>10/14/2018</a:t>
             </a:fld>
             <a:endParaRPr lang="en-US"/>
           </a:p>
@@ -3273,7 +3273,7 @@
           <a:p>
             <a:fld id="{E0E3E4AF-3478-F94E-9240-CA1945652EFF}" type="slidenum">
               <a:rPr lang="en-US" smtClean="0"/>
-              <a:t>‹#›</a:t>
+              <a:t>‹Nº›</a:t>
             </a:fld>
             <a:endParaRPr lang="en-US"/>
           </a:p>
@@ -3847,16 +3847,6 @@
               </a:rPr>
               <a:t>Enter Trail</a:t>
             </a:r>
-            <a:r>
-              <a:rPr lang="mr-IN" sz="2000" dirty="0">
-                <a:solidFill>
-                  <a:schemeClr val="bg1"/>
-                </a:solidFill>
-                <a:latin typeface="Open Sans" panose="020B0606030504020204" pitchFamily="34" charset="0"/>
-                <a:ea typeface="Open Sans" panose="020B0606030504020204" pitchFamily="34" charset="0"/>
-              </a:rPr>
-              <a:t>…</a:t>
-            </a:r>
             <a:endParaRPr lang="en-US" sz="2000" dirty="0">
               <a:solidFill>
                 <a:schemeClr val="bg1"/>
@@ -4174,7 +4164,7 @@
                 <a:ea typeface="Open Sans" panose="020B0606030504020204" pitchFamily="34" charset="0"/>
                 <a:cs typeface="Open Sans" panose="020B0606030504020204" pitchFamily="34" charset="0"/>
               </a:rPr>
-              <a:t>AMERICAS CUP </a:t>
+              <a:t>EXERCISE TITLE </a:t>
             </a:r>
           </a:p>
           <a:p>
@@ -4187,7 +4177,7 @@
                 <a:ea typeface="Open Sans" panose="020B0606030504020204" pitchFamily="34" charset="0"/>
                 <a:cs typeface="Open Sans" panose="020B0606030504020204" pitchFamily="34" charset="0"/>
               </a:rPr>
-              <a:t>2018. RACE 2A</a:t>
+              <a:t>2018 SERIAL 12D</a:t>
             </a:r>
           </a:p>
         </p:txBody>
@@ -4313,6 +4303,92 @@
               </a:rPr>
               <a:t>AAAA</a:t>
             </a:r>
+          </a:p>
+        </p:txBody>
+      </p:sp>
+      <p:sp>
+        <p:nvSpPr>
+          <p:cNvPr id="6" name="ScaleBar">
+            <a:extLst>
+              <a:ext uri="{FF2B5EF4-FFF2-40B4-BE49-F238E27FC236}">
+                <a16:creationId xmlns:a16="http://schemas.microsoft.com/office/drawing/2014/main" id="{BE0A2202-FFB4-4A60-9052-9A3901AFC4B2}"/>
+              </a:ext>
+            </a:extLst>
+          </p:cNvPr>
+          <p:cNvSpPr/>
+          <p:nvPr/>
+        </p:nvSpPr>
+        <p:spPr>
+          <a:xfrm>
+            <a:off x="2611284" y="4781025"/>
+            <a:ext cx="2231413" cy="45719"/>
+          </a:xfrm>
+          <a:prstGeom prst="rect">
+            <a:avLst/>
+          </a:prstGeom>
+          <a:solidFill>
+            <a:schemeClr val="dk1"/>
+          </a:solidFill>
+          <a:ln>
+            <a:noFill/>
+          </a:ln>
+        </p:spPr>
+        <p:style>
+          <a:lnRef idx="0">
+            <a:scrgbClr r="0" g="0" b="0"/>
+          </a:lnRef>
+          <a:fillRef idx="0">
+            <a:scrgbClr r="0" g="0" b="0"/>
+          </a:fillRef>
+          <a:effectRef idx="0">
+            <a:scrgbClr r="0" g="0" b="0"/>
+          </a:effectRef>
+          <a:fontRef idx="minor">
+            <a:schemeClr val="lt1"/>
+          </a:fontRef>
+        </p:style>
+        <p:txBody>
+          <a:bodyPr rtlCol="0" anchor="ctr"/>
+          <a:lstStyle/>
+          <a:p>
+            <a:pPr algn="ctr"/>
+            <a:endParaRPr lang="es-AR" dirty="0"/>
+          </a:p>
+        </p:txBody>
+      </p:sp>
+      <p:sp>
+        <p:nvSpPr>
+          <p:cNvPr id="7" name="ScaleValue">
+            <a:extLst>
+              <a:ext uri="{FF2B5EF4-FFF2-40B4-BE49-F238E27FC236}">
+                <a16:creationId xmlns:a16="http://schemas.microsoft.com/office/drawing/2014/main" id="{281A5C4D-5878-421A-96B6-3E7E1B6B0BE4}"/>
+              </a:ext>
+            </a:extLst>
+          </p:cNvPr>
+          <p:cNvSpPr txBox="1"/>
+          <p:nvPr/>
+        </p:nvSpPr>
+        <p:spPr>
+          <a:xfrm>
+            <a:off x="2490173" y="4374197"/>
+            <a:ext cx="2543125" cy="369332"/>
+          </a:xfrm>
+          <a:prstGeom prst="rect">
+            <a:avLst/>
+          </a:prstGeom>
+          <a:noFill/>
+        </p:spPr>
+        <p:txBody>
+          <a:bodyPr wrap="none" rtlCol="0">
+            <a:spAutoFit/>
+          </a:bodyPr>
+          <a:lstStyle/>
+          <a:p>
+            <a:r>
+              <a:rPr lang="es-ES_tradnl" dirty="0"/>
+              <a:t>1 km</a:t>
+            </a:r>
+            <a:endParaRPr lang="es-AR" dirty="0"/>
           </a:p>
         </p:txBody>
       </p:sp>

</xml_diff>